<commit_message>
Updated diagram, object properties in pptx, declared functions.
</commit_message>
<xml_diff>
--- a/Presentation1.pptx
+++ b/Presentation1.pptx
@@ -4666,7 +4666,7 @@
         </p:nvSpPr>
         <p:spPr>
           <a:xfrm>
-            <a:off x="3675197" y="5955021"/>
+            <a:off x="3774707" y="5915057"/>
             <a:ext cx="2508444" cy="307777"/>
           </a:xfrm>
           <a:prstGeom prst="rect">
@@ -4682,7 +4682,7 @@
           <a:p>
             <a:r>
               <a:rPr lang="en-US" sz="1400" dirty="0" err="1"/>
-              <a:t>normalIWeightedString</a:t>
+              <a:t>normalIWeightedStr</a:t>
             </a:r>
             <a:r>
               <a:rPr lang="en-US" sz="1400" dirty="0"/>
@@ -4706,7 +4706,7 @@
         <p:spPr>
           <a:xfrm>
             <a:off x="7814611" y="6527816"/>
-            <a:ext cx="2093522" cy="307777"/>
+            <a:ext cx="1872307" cy="307777"/>
           </a:xfrm>
           <a:prstGeom prst="rect">
             <a:avLst/>
@@ -4721,7 +4721,7 @@
           <a:p>
             <a:r>
               <a:rPr lang="en-US" sz="1400" dirty="0" err="1"/>
-              <a:t>normalItemString</a:t>
+              <a:t>normalItemStr</a:t>
             </a:r>
             <a:r>
               <a:rPr lang="en-US" sz="1400" dirty="0"/>
@@ -5044,8 +5044,8 @@
         </p:nvSpPr>
         <p:spPr>
           <a:xfrm>
-            <a:off x="9795692" y="5316484"/>
-            <a:ext cx="1550617" cy="307777"/>
+            <a:off x="9919073" y="5361252"/>
+            <a:ext cx="1329403" cy="307777"/>
           </a:xfrm>
           <a:prstGeom prst="rect">
             <a:avLst/>
@@ -5060,7 +5060,7 @@
           <a:p>
             <a:r>
               <a:rPr lang="en-US" sz="1400" dirty="0" err="1"/>
-              <a:t>getWeightedString</a:t>
+              <a:t>getWeightedStr</a:t>
             </a:r>
             <a:endParaRPr lang="en-US" sz="1400" dirty="0"/>
           </a:p>
@@ -5325,15 +5325,7 @@
           <a:p>
             <a:r>
               <a:rPr lang="en-US" sz="1400" dirty="0" err="1"/>
-              <a:t>normalItemObj:Object</a:t>
-            </a:r>
-            <a:r>
-              <a:rPr lang="en-US" sz="1400" dirty="0"/>
-              <a:t>[] , </a:t>
-            </a:r>
-            <a:r>
-              <a:rPr lang="en-US" sz="1400" dirty="0" err="1"/>
-              <a:t>weightedItem</a:t>
+              <a:t>normalAndWeightedObj</a:t>
             </a:r>
             <a:r>
               <a:rPr lang="en-US" sz="1400" dirty="0"/>
@@ -5356,8 +5348,8 @@
         </p:nvSpPr>
         <p:spPr>
           <a:xfrm>
-            <a:off x="8256304" y="5056058"/>
-            <a:ext cx="1200265" cy="307777"/>
+            <a:off x="7840961" y="5039804"/>
+            <a:ext cx="1963423" cy="307777"/>
           </a:xfrm>
           <a:prstGeom prst="rect">
             <a:avLst/>
@@ -5371,7 +5363,7 @@
           <a:p>
             <a:r>
               <a:rPr lang="en-US" sz="1400" dirty="0" err="1"/>
-              <a:t>weightedItem</a:t>
+              <a:t>normalAndWeightedObj</a:t>
             </a:r>
             <a:endParaRPr lang="en-US" sz="1400" dirty="0"/>
           </a:p>
@@ -5392,7 +5384,7 @@
         <p:spPr>
           <a:xfrm>
             <a:off x="7810531" y="5638274"/>
-            <a:ext cx="2141227" cy="307777"/>
+            <a:ext cx="1920013" cy="307777"/>
           </a:xfrm>
           <a:prstGeom prst="rect">
             <a:avLst/>
@@ -5406,7 +5398,7 @@
           <a:p>
             <a:r>
               <a:rPr lang="en-US" sz="1400" dirty="0" err="1"/>
-              <a:t>weightedItemString</a:t>
+              <a:t>weightedItemStr</a:t>
             </a:r>
             <a:r>
               <a:rPr lang="en-US" sz="1400" dirty="0"/>
@@ -5429,8 +5421,8 @@
         </p:nvSpPr>
         <p:spPr>
           <a:xfrm>
-            <a:off x="8246584" y="5952038"/>
-            <a:ext cx="1300036" cy="307777"/>
+            <a:off x="7832288" y="5881024"/>
+            <a:ext cx="1963423" cy="307777"/>
           </a:xfrm>
           <a:prstGeom prst="rect">
             <a:avLst/>
@@ -5444,7 +5436,7 @@
           <a:p>
             <a:r>
               <a:rPr lang="en-US" sz="1400" dirty="0" err="1"/>
-              <a:t>normalItemObj</a:t>
+              <a:t>normalAndWeightedObj</a:t>
             </a:r>
             <a:endParaRPr lang="en-US" sz="1400" dirty="0"/>
           </a:p>
@@ -5775,7 +5767,7 @@
         <p:spPr>
           <a:xfrm>
             <a:off x="512110" y="4739347"/>
-            <a:ext cx="1747017" cy="1815882"/>
+            <a:ext cx="2147767" cy="1600438"/>
           </a:xfrm>
           <a:prstGeom prst="rect">
             <a:avLst/>
@@ -5790,21 +5782,11 @@
           <a:p>
             <a:r>
               <a:rPr lang="en-US" sz="1400" dirty="0" err="1"/>
-              <a:t>normalItemObj</a:t>
+              <a:t>normalAndWeightedObj</a:t>
             </a:r>
             <a:r>
               <a:rPr lang="en-US" sz="1400" dirty="0"/>
-              <a:t>,</a:t>
-            </a:r>
-          </a:p>
-          <a:p>
-            <a:r>
-              <a:rPr lang="en-US" sz="1400" dirty="0" err="1"/>
-              <a:t>weightedItemobj</a:t>
-            </a:r>
-            <a:r>
-              <a:rPr lang="en-US" sz="1400" dirty="0"/>
-              <a:t>: {</a:t>
+              <a:t> : {</a:t>
             </a:r>
           </a:p>
           <a:p>

</xml_diff>